<commit_message>
Send a message when the person name changes.
</commit_message>
<xml_diff>
--- a/Message Bus.pptx
+++ b/Message Bus.pptx
@@ -15091,11 +15091,7 @@
           <a:p>
             <a:r>
               <a:rPr lang="en-US" dirty="0" smtClean="0"/>
-              <a:t>Burst </a:t>
-            </a:r>
-            <a:r>
-              <a:rPr lang="en-US" dirty="0" smtClean="0"/>
-              <a:t>on one feature</a:t>
+              <a:t>Burst on one feature</a:t>
             </a:r>
           </a:p>
           <a:p>
@@ -15208,7 +15204,6 @@
               <a:rPr lang="en-US" dirty="0" smtClean="0"/>
               <a:t>github.com/dallasxaml/MessageBus.git</a:t>
             </a:r>
-            <a:endParaRPr lang="en-US" dirty="0" smtClean="0"/>
           </a:p>
           <a:p>
             <a:r>
@@ -15401,7 +15396,6 @@
               <a:rPr lang="en-US" dirty="0" smtClean="0"/>
               <a:t>Subscribe to message to update list</a:t>
             </a:r>
-            <a:endParaRPr lang="en-US" dirty="0" smtClean="0"/>
           </a:p>
           <a:p>
             <a:endParaRPr lang="en-US" dirty="0"/>
@@ -15513,14 +15507,30 @@
           </a:p>
           <a:p>
             <a:r>
-              <a:rPr lang="en-US" dirty="0" smtClean="0"/>
-              <a:t>Broadcast Person name</a:t>
+              <a:rPr lang="en-US" smtClean="0"/>
+              <a:t>PersonNameChanged</a:t>
             </a:r>
+            <a:endParaRPr lang="en-US" dirty="0" smtClean="0"/>
           </a:p>
           <a:p>
             <a:r>
               <a:rPr lang="en-US" dirty="0" smtClean="0"/>
-              <a:t>Register for Person name</a:t>
+              <a:t>Send </a:t>
+            </a:r>
+            <a:r>
+              <a:rPr lang="en-US" dirty="0" err="1" smtClean="0"/>
+              <a:t>PersonNameChanged</a:t>
+            </a:r>
+            <a:endParaRPr lang="en-US" dirty="0" smtClean="0"/>
+          </a:p>
+          <a:p>
+            <a:r>
+              <a:rPr lang="en-US" dirty="0" smtClean="0"/>
+              <a:t>Register for </a:t>
+            </a:r>
+            <a:r>
+              <a:rPr lang="en-US" dirty="0" err="1" smtClean="0"/>
+              <a:t>PersonNameChanged</a:t>
             </a:r>
             <a:endParaRPr lang="en-US" dirty="0"/>
           </a:p>

</xml_diff>